<commit_message>
Renewal of Navmesh Obstacles
- Add and delete resource data

- Implementation of repetitive
  movement left and right using
  ping-pong function

- Set up and place dynamically
  movable navmesh obstacles at
  runtime
</commit_message>
<xml_diff>
--- a/Assets/Class/NavMesh Agent/PPT Data/NavMesh Example.pptx
+++ b/Assets/Class/NavMesh Agent/PPT Data/NavMesh Example.pptx
@@ -2,24 +2,24 @@
 <file path=ppt/presentation.xml><?xml version="1.0" encoding="utf-8"?>
 <p:presentation xmlns:a="http://schemas.openxmlformats.org/drawingml/2006/main" xmlns:r="http://schemas.openxmlformats.org/officeDocument/2006/relationships" xmlns:p="http://schemas.openxmlformats.org/presentationml/2006/main" xmlns:p14="http://schemas.microsoft.com/office/powerpoint/2010/main" saveSubsetFonts="1" firstSlideNum="0">
   <p:sldMasterIdLst>
-    <p:sldMasterId id="2147486131" r:id="rId12"/>
+    <p:sldMasterId id="2147486132" r:id="rId12"/>
   </p:sldMasterIdLst>
   <p:notesMasterIdLst>
     <p:notesMasterId r:id="rId14"/>
   </p:notesMasterIdLst>
   <p:sldIdLst>
     <p:sldId id="299" r:id="rId16"/>
-    <p:sldId id="287" r:id="rId17"/>
-    <p:sldId id="300" r:id="rId18"/>
-    <p:sldId id="301" r:id="rId19"/>
-    <p:sldId id="303" r:id="rId20"/>
-    <p:sldId id="302" r:id="rId21"/>
-    <p:sldId id="298" r:id="rId22"/>
-    <p:sldId id="304" r:id="rId23"/>
-    <p:sldId id="305" r:id="rId24"/>
-    <p:sldId id="306" r:id="rId25"/>
-    <p:sldId id="307" r:id="rId26"/>
-    <p:sldId id="308" r:id="rId27"/>
+    <p:sldId id="287" r:id="rId18"/>
+    <p:sldId id="300" r:id="rId20"/>
+    <p:sldId id="301" r:id="rId22"/>
+    <p:sldId id="303" r:id="rId24"/>
+    <p:sldId id="302" r:id="rId26"/>
+    <p:sldId id="298" r:id="rId28"/>
+    <p:sldId id="304" r:id="rId29"/>
+    <p:sldId id="305" r:id="rId31"/>
+    <p:sldId id="306" r:id="rId33"/>
+    <p:sldId id="307" r:id="rId35"/>
+    <p:sldId id="308" r:id="rId37"/>
   </p:sldIdLst>
   <p:sldSz cx="12192000" cy="6858000"/>
   <p:notesSz cx="6858000" cy="9144000"/>
@@ -11999,9 +11999,9 @@
           <p:nvPr/>
         </p:nvSpPr>
         <p:spPr>
-          <a:xfrm rot="0">
+          <a:xfrm>
             <a:off x="1116330" y="4856480"/>
-            <a:ext cx="4283075" cy="923925"/>
+            <a:ext cx="4283710" cy="923925"/>
           </a:xfrm>
           <a:prstGeom prst="rect"/>
           <a:noFill/>
@@ -12038,39 +12038,11 @@
               <a:t> </a:t>
             </a:r>
             <a:r>
-              <a:rPr lang="ko-KR" sz="1800">
-                <a:latin typeface="맑은 고딕" charset="0"/>
-                <a:ea typeface="맑은 고딕" charset="0"/>
-              </a:rPr>
-              <a:t>그</a:t>
-            </a:r>
-            <a:r>
-              <a:rPr lang="ko-KR" sz="1800">
-                <a:latin typeface="맑은 고딕" charset="0"/>
-                <a:ea typeface="맑은 고딕" charset="0"/>
-              </a:rPr>
-              <a:t>런 다음</a:t>
-            </a:r>
-            <a:r>
-              <a:rPr lang="ko-KR" sz="1800">
-                <a:latin typeface="맑은 고딕" charset="0"/>
-                <a:ea typeface="맑은 고딕" charset="0"/>
-              </a:rPr>
-              <a:t> NavMeshAgent가 이동하기 위한 범위를</a:t>
-            </a:r>
-            <a:r>
-              <a:rPr lang="ko-KR" sz="1800">
-                <a:latin typeface="맑은 고딕" charset="0"/>
-                <a:ea typeface="맑은 고딕" charset="0"/>
-              </a:rPr>
-              <a:t> 설정되었으면</a:t>
-            </a:r>
-            <a:r>
-              <a:rPr lang="ko-KR" sz="1800">
-                <a:latin typeface="맑은 고딕" charset="0"/>
-                <a:ea typeface="맑은 고딕" charset="0"/>
-              </a:rPr>
-              <a:t> Bake를 선택합니다.</a:t>
+              <a:rPr sz="1800">
+                <a:latin typeface="맑은 고딕" charset="0"/>
+                <a:ea typeface="맑은 고딕" charset="0"/>
+              </a:rPr>
+              <a:t>그런 다음 NavMeshAgent가 이동할 수 있는 범위를 설정하였으면 Bake를 선택합니다.</a:t>
             </a:r>
             <a:endParaRPr lang="ko-KR" altLang="en-US" sz="1800">
               <a:latin typeface="맑은 고딕" charset="0"/>
@@ -12081,7 +12053,7 @@
       </p:sp>
       <p:pic>
         <p:nvPicPr>
-          <p:cNvPr id="1199" name="그림 127" descr="C:/Users/Admin1/AppData/Roaming/PolarisOffice/ETemp/8256_23257792/fImage243783454827.png"/>
+          <p:cNvPr id="1199" name="그림 127"/>
           <p:cNvPicPr>
             <a:picLocks noChangeAspect="1"/>
           </p:cNvPicPr>
@@ -12226,7 +12198,7 @@
       </p:sp>
       <p:pic>
         <p:nvPicPr>
-          <p:cNvPr id="1201" name="그림 93" descr="C:/Users/Admin1/AppData/Roaming/PolarisOffice/ETemp/8256_23257792/fImage930023004827.png"/>
+          <p:cNvPr id="1201" name="그림 93"/>
           <p:cNvPicPr>
             <a:picLocks noChangeAspect="1"/>
           </p:cNvPicPr>

</xml_diff>